<commit_message>
Lecture 1: Updated ppt
</commit_message>
<xml_diff>
--- a/01-Statistics_Inference_Sampling/1-statistics-inference-sampling.pptx
+++ b/01-Statistics_Inference_Sampling/1-statistics-inference-sampling.pptx
@@ -114,6 +114,11 @@
       </a:defRPr>
     </a:lvl9pPr>
   </p:defaultTextStyle>
+  <p:extLst>
+    <p:ext uri="{EFAFB233-063F-42B5-8137-9DF3F51BA10A}">
+      <p15:sldGuideLst xmlns:p15="http://schemas.microsoft.com/office/powerpoint/2012/main"/>
+    </p:ext>
+  </p:extLst>
 </p:presentation>
 </file>
 
@@ -199,7 +204,7 @@
           <a:p>
             <a:fld id="{25885042-B3DA-0E43-A268-6486A17E920D}" type="datetimeFigureOut">
               <a:rPr lang="en-US" smtClean="0"/>
-              <a:t>1/9/18</a:t>
+              <a:t>1/10/18</a:t>
             </a:fld>
             <a:endParaRPr lang="en-US"/>
           </a:p>
@@ -598,7 +603,7 @@
           <a:p>
             <a:fld id="{B2157833-D786-9846-90E7-E56345D9C265}" type="datetimeFigureOut">
               <a:rPr lang="en-US" smtClean="0"/>
-              <a:t>1/9/18</a:t>
+              <a:t>1/10/18</a:t>
             </a:fld>
             <a:endParaRPr lang="en-US"/>
           </a:p>
@@ -768,7 +773,7 @@
           <a:p>
             <a:fld id="{B2157833-D786-9846-90E7-E56345D9C265}" type="datetimeFigureOut">
               <a:rPr lang="en-US" smtClean="0"/>
-              <a:t>1/9/18</a:t>
+              <a:t>1/10/18</a:t>
             </a:fld>
             <a:endParaRPr lang="en-US"/>
           </a:p>
@@ -948,7 +953,7 @@
           <a:p>
             <a:fld id="{B2157833-D786-9846-90E7-E56345D9C265}" type="datetimeFigureOut">
               <a:rPr lang="en-US" smtClean="0"/>
-              <a:t>1/9/18</a:t>
+              <a:t>1/10/18</a:t>
             </a:fld>
             <a:endParaRPr lang="en-US"/>
           </a:p>
@@ -1118,7 +1123,7 @@
           <a:p>
             <a:fld id="{B2157833-D786-9846-90E7-E56345D9C265}" type="datetimeFigureOut">
               <a:rPr lang="en-US" smtClean="0"/>
-              <a:t>1/9/18</a:t>
+              <a:t>1/10/18</a:t>
             </a:fld>
             <a:endParaRPr lang="en-US"/>
           </a:p>
@@ -1364,7 +1369,7 @@
           <a:p>
             <a:fld id="{B2157833-D786-9846-90E7-E56345D9C265}" type="datetimeFigureOut">
               <a:rPr lang="en-US" smtClean="0"/>
-              <a:t>1/9/18</a:t>
+              <a:t>1/10/18</a:t>
             </a:fld>
             <a:endParaRPr lang="en-US"/>
           </a:p>
@@ -1596,7 +1601,7 @@
           <a:p>
             <a:fld id="{B2157833-D786-9846-90E7-E56345D9C265}" type="datetimeFigureOut">
               <a:rPr lang="en-US" smtClean="0"/>
-              <a:t>1/9/18</a:t>
+              <a:t>1/10/18</a:t>
             </a:fld>
             <a:endParaRPr lang="en-US"/>
           </a:p>
@@ -1963,7 +1968,7 @@
           <a:p>
             <a:fld id="{B2157833-D786-9846-90E7-E56345D9C265}" type="datetimeFigureOut">
               <a:rPr lang="en-US" smtClean="0"/>
-              <a:t>1/9/18</a:t>
+              <a:t>1/10/18</a:t>
             </a:fld>
             <a:endParaRPr lang="en-US"/>
           </a:p>
@@ -2081,7 +2086,7 @@
           <a:p>
             <a:fld id="{B2157833-D786-9846-90E7-E56345D9C265}" type="datetimeFigureOut">
               <a:rPr lang="en-US" smtClean="0"/>
-              <a:t>1/9/18</a:t>
+              <a:t>1/10/18</a:t>
             </a:fld>
             <a:endParaRPr lang="en-US"/>
           </a:p>
@@ -2176,7 +2181,7 @@
           <a:p>
             <a:fld id="{B2157833-D786-9846-90E7-E56345D9C265}" type="datetimeFigureOut">
               <a:rPr lang="en-US" smtClean="0"/>
-              <a:t>1/9/18</a:t>
+              <a:t>1/10/18</a:t>
             </a:fld>
             <a:endParaRPr lang="en-US"/>
           </a:p>
@@ -2453,7 +2458,7 @@
           <a:p>
             <a:fld id="{B2157833-D786-9846-90E7-E56345D9C265}" type="datetimeFigureOut">
               <a:rPr lang="en-US" smtClean="0"/>
-              <a:t>1/9/18</a:t>
+              <a:t>1/10/18</a:t>
             </a:fld>
             <a:endParaRPr lang="en-US"/>
           </a:p>
@@ -2706,7 +2711,7 @@
           <a:p>
             <a:fld id="{B2157833-D786-9846-90E7-E56345D9C265}" type="datetimeFigureOut">
               <a:rPr lang="en-US" smtClean="0"/>
-              <a:t>1/9/18</a:t>
+              <a:t>1/10/18</a:t>
             </a:fld>
             <a:endParaRPr lang="en-US"/>
           </a:p>
@@ -2919,7 +2924,7 @@
           <a:p>
             <a:fld id="{B2157833-D786-9846-90E7-E56345D9C265}" type="datetimeFigureOut">
               <a:rPr lang="en-US" smtClean="0"/>
-              <a:t>1/9/18</a:t>
+              <a:t>1/10/18</a:t>
             </a:fld>
             <a:endParaRPr lang="en-US"/>
           </a:p>
@@ -3365,8 +3370,8 @@
         </p:nvSpPr>
         <p:spPr>
           <a:xfrm>
-            <a:off x="734096" y="2859110"/>
-            <a:ext cx="11457904" cy="2398690"/>
+            <a:off x="388307" y="2859110"/>
+            <a:ext cx="6851737" cy="3554216"/>
           </a:xfrm>
         </p:spPr>
         <p:txBody>
@@ -3380,14 +3385,16 @@
               <a:buChar char="•"/>
             </a:pPr>
             <a:r>
-              <a:rPr lang="en-US" sz="3200" dirty="0" smtClean="0"/>
-              <a:t>Notes on website </a:t>
-            </a:r>
-            <a:r>
               <a:rPr lang="en-US" sz="3200" dirty="0" smtClean="0">
                 <a:hlinkClick r:id="rId2"/>
               </a:rPr>
-              <a:t>https://besler.github.io/McCaigStatisticsGroup/</a:t>
+              <a:t>https</a:t>
+            </a:r>
+            <a:r>
+              <a:rPr lang="en-US" sz="3200" dirty="0" smtClean="0">
+                <a:hlinkClick r:id="rId2"/>
+              </a:rPr>
+              <a:t>://besler.github.io/McCaigStatisticsGroup/</a:t>
             </a:r>
             <a:endParaRPr lang="en-US" sz="3200" dirty="0" smtClean="0"/>
           </a:p>
@@ -3402,7 +3409,15 @@
             </a:r>
             <a:r>
               <a:rPr lang="en-US" sz="3200" dirty="0" smtClean="0"/>
-              <a:t> contains Google Calendar</a:t>
+              <a:t>, </a:t>
+            </a:r>
+            <a:r>
+              <a:rPr lang="en-US" sz="3200" dirty="0" smtClean="0"/>
+              <a:t>Google </a:t>
+            </a:r>
+            <a:r>
+              <a:rPr lang="en-US" sz="3200" dirty="0" smtClean="0"/>
+              <a:t>Calendar</a:t>
             </a:r>
           </a:p>
           <a:p>
@@ -3427,6 +3442,36 @@
           </a:p>
         </p:txBody>
       </p:sp>
+      <p:pic>
+        <p:nvPicPr>
+          <p:cNvPr id="4" name="Picture 3"/>
+          <p:cNvPicPr>
+            <a:picLocks noChangeAspect="1"/>
+          </p:cNvPicPr>
+          <p:nvPr/>
+        </p:nvPicPr>
+        <p:blipFill>
+          <a:blip r:embed="rId3">
+            <a:extLst>
+              <a:ext uri="{28A0092B-C50C-407E-A947-70E740481C1C}">
+                <a14:useLocalDpi xmlns:a14="http://schemas.microsoft.com/office/drawing/2010/main" val="0"/>
+              </a:ext>
+            </a:extLst>
+          </a:blip>
+          <a:stretch>
+            <a:fillRect/>
+          </a:stretch>
+        </p:blipFill>
+        <p:spPr>
+          <a:xfrm>
+            <a:off x="7240044" y="1252602"/>
+            <a:ext cx="4612095" cy="4790858"/>
+          </a:xfrm>
+          <a:prstGeom prst="rect">
+            <a:avLst/>
+          </a:prstGeom>
+        </p:spPr>
+      </p:pic>
     </p:spTree>
     <p:extLst>
       <p:ext uri="{BB962C8B-B14F-4D97-AF65-F5344CB8AC3E}">
@@ -3437,6 +3482,13 @@
   <p:clrMapOvr>
     <a:masterClrMapping/>
   </p:clrMapOvr>
+  <p:timing>
+    <p:tnLst>
+      <p:par>
+        <p:cTn id="1" dur="indefinite" restart="never" nodeType="tmRoot"/>
+      </p:par>
+    </p:tnLst>
+  </p:timing>
 </p:sld>
 </file>
 
@@ -3467,6 +3519,13 @@
   <p:clrMapOvr>
     <a:masterClrMapping/>
   </p:clrMapOvr>
+  <p:timing>
+    <p:tnLst>
+      <p:par>
+        <p:cTn id="1" dur="indefinite" restart="never" nodeType="tmRoot"/>
+      </p:par>
+    </p:tnLst>
+  </p:timing>
 </p:sld>
 </file>
 
@@ -3510,35 +3569,213 @@
           </a:p>
         </p:txBody>
       </p:sp>
-      <p:pic>
-        <p:nvPicPr>
-          <p:cNvPr id="4" name="Content Placeholder 3"/>
-          <p:cNvPicPr>
-            <a:picLocks noGrp="1" noChangeAspect="1"/>
-          </p:cNvPicPr>
+      <p:sp>
+        <p:nvSpPr>
+          <p:cNvPr id="3" name="Content Placeholder 2"/>
+          <p:cNvSpPr>
+            <a:spLocks noGrp="1"/>
+          </p:cNvSpPr>
           <p:nvPr>
             <p:ph idx="1"/>
           </p:nvPr>
-        </p:nvPicPr>
-        <p:blipFill>
-          <a:blip r:embed="rId2">
-            <a:extLst>
-              <a:ext uri="{28A0092B-C50C-407E-A947-70E740481C1C}">
-                <a14:useLocalDpi xmlns:a14="http://schemas.microsoft.com/office/drawing/2010/main" val="0"/>
-              </a:ext>
-            </a:extLst>
-          </a:blip>
-          <a:stretch>
-            <a:fillRect/>
-          </a:stretch>
-        </p:blipFill>
-        <p:spPr>
-          <a:xfrm>
-            <a:off x="336000" y="2030892"/>
-            <a:ext cx="11520000" cy="2796217"/>
-          </a:xfrm>
-        </p:spPr>
-      </p:pic>
+        </p:nvSpPr>
+        <p:spPr/>
+        <p:txBody>
+          <a:bodyPr>
+            <a:normAutofit fontScale="92500" lnSpcReduction="10000"/>
+          </a:bodyPr>
+          <a:lstStyle/>
+          <a:p>
+            <a:pPr marL="0" indent="0" algn="just">
+              <a:lnSpc>
+                <a:spcPct val="150000"/>
+              </a:lnSpc>
+              <a:buNone/>
+            </a:pPr>
+            <a:r>
+              <a:rPr lang="en-US" sz="2400" dirty="0">
+                <a:latin typeface="Arial" charset="0"/>
+                <a:ea typeface="Arial" charset="0"/>
+                <a:cs typeface="Arial" charset="0"/>
+              </a:rPr>
+              <a:t>The Graduate Student Association (GSA) </a:t>
+            </a:r>
+            <a:r>
+              <a:rPr lang="en-US" sz="2400" dirty="0" smtClean="0">
+                <a:latin typeface="Arial" charset="0"/>
+                <a:ea typeface="Arial" charset="0"/>
+                <a:cs typeface="Arial" charset="0"/>
+              </a:rPr>
+              <a:t>offers </a:t>
+            </a:r>
+            <a:r>
+              <a:rPr lang="en-US" sz="2400" dirty="0">
+                <a:latin typeface="Arial" charset="0"/>
+                <a:ea typeface="Arial" charset="0"/>
+                <a:cs typeface="Arial" charset="0"/>
+              </a:rPr>
+              <a:t>workshops on </a:t>
+            </a:r>
+            <a:r>
+              <a:rPr lang="en-US" sz="2400" dirty="0" smtClean="0">
+                <a:latin typeface="Arial" charset="0"/>
+                <a:ea typeface="Arial" charset="0"/>
+                <a:cs typeface="Arial" charset="0"/>
+              </a:rPr>
+              <a:t>scholarship writing </a:t>
+            </a:r>
+            <a:r>
+              <a:rPr lang="en-US" sz="2400" dirty="0">
+                <a:latin typeface="Arial" charset="0"/>
+                <a:ea typeface="Arial" charset="0"/>
+                <a:cs typeface="Arial" charset="0"/>
+              </a:rPr>
+              <a:t>for students. They are interested in how </a:t>
+            </a:r>
+            <a:r>
+              <a:rPr lang="en-US" sz="2400" dirty="0" smtClean="0">
+                <a:latin typeface="Arial" charset="0"/>
+                <a:ea typeface="Arial" charset="0"/>
+                <a:cs typeface="Arial" charset="0"/>
+              </a:rPr>
+              <a:t>effective </a:t>
+            </a:r>
+            <a:r>
+              <a:rPr lang="en-US" sz="2400" dirty="0">
+                <a:latin typeface="Arial" charset="0"/>
+                <a:ea typeface="Arial" charset="0"/>
+                <a:cs typeface="Arial" charset="0"/>
+              </a:rPr>
+              <a:t>these workshops are at helping </a:t>
+            </a:r>
+            <a:r>
+              <a:rPr lang="en-US" sz="2400" dirty="0" smtClean="0">
+                <a:latin typeface="Arial" charset="0"/>
+                <a:ea typeface="Arial" charset="0"/>
+                <a:cs typeface="Arial" charset="0"/>
+              </a:rPr>
+              <a:t>students </a:t>
+            </a:r>
+            <a:r>
+              <a:rPr lang="en-US" sz="2400" dirty="0">
+                <a:latin typeface="Arial" charset="0"/>
+                <a:ea typeface="Arial" charset="0"/>
+                <a:cs typeface="Arial" charset="0"/>
+              </a:rPr>
+              <a:t>secure funding. In the last 5 years, 2198 students applied to national funding (</a:t>
+            </a:r>
+            <a:r>
+              <a:rPr lang="en-US" sz="2400" dirty="0" smtClean="0">
+                <a:latin typeface="Arial" charset="0"/>
+                <a:ea typeface="Arial" charset="0"/>
+                <a:cs typeface="Arial" charset="0"/>
+              </a:rPr>
+              <a:t>NSERC,CIHR</a:t>
+            </a:r>
+            <a:r>
+              <a:rPr lang="en-US" sz="2400" dirty="0">
+                <a:latin typeface="Arial" charset="0"/>
+                <a:ea typeface="Arial" charset="0"/>
+                <a:cs typeface="Arial" charset="0"/>
+              </a:rPr>
+              <a:t>, SSHRC). Of those students, 916 attended a workshop on scholarship writing. </a:t>
+            </a:r>
+            <a:r>
+              <a:rPr lang="en-US" sz="2400" dirty="0" smtClean="0">
+                <a:latin typeface="Arial" charset="0"/>
+                <a:ea typeface="Arial" charset="0"/>
+                <a:cs typeface="Arial" charset="0"/>
+              </a:rPr>
+              <a:t>The GSA </a:t>
+            </a:r>
+            <a:r>
+              <a:rPr lang="en-US" sz="2400" dirty="0">
+                <a:latin typeface="Arial" charset="0"/>
+                <a:ea typeface="Arial" charset="0"/>
+                <a:cs typeface="Arial" charset="0"/>
+              </a:rPr>
+              <a:t>is able to attain the amount of money each student was awarded in national </a:t>
+            </a:r>
+            <a:r>
+              <a:rPr lang="en-US" sz="2400" dirty="0" smtClean="0">
+                <a:latin typeface="Arial" charset="0"/>
+                <a:ea typeface="Arial" charset="0"/>
+                <a:cs typeface="Arial" charset="0"/>
+              </a:rPr>
+              <a:t>funding. They </a:t>
+            </a:r>
+            <a:r>
+              <a:rPr lang="en-US" sz="2400" dirty="0">
+                <a:latin typeface="Arial" charset="0"/>
+                <a:ea typeface="Arial" charset="0"/>
+                <a:cs typeface="Arial" charset="0"/>
+              </a:rPr>
+              <a:t>discover that students who attend the </a:t>
+            </a:r>
+            <a:r>
+              <a:rPr lang="en-US" sz="2400" dirty="0" smtClean="0">
+                <a:latin typeface="Arial" charset="0"/>
+                <a:ea typeface="Arial" charset="0"/>
+                <a:cs typeface="Arial" charset="0"/>
+              </a:rPr>
+              <a:t>scholarships </a:t>
+            </a:r>
+            <a:r>
+              <a:rPr lang="en-US" sz="2400" dirty="0">
+                <a:latin typeface="Arial" charset="0"/>
+                <a:ea typeface="Arial" charset="0"/>
+                <a:cs typeface="Arial" charset="0"/>
+              </a:rPr>
+              <a:t>workshop secure an average of $</a:t>
+            </a:r>
+            <a:r>
+              <a:rPr lang="en-US" sz="2400" dirty="0" smtClean="0">
+                <a:latin typeface="Arial" charset="0"/>
+                <a:ea typeface="Arial" charset="0"/>
+                <a:cs typeface="Arial" charset="0"/>
+              </a:rPr>
+              <a:t>5,680 more </a:t>
+            </a:r>
+            <a:r>
+              <a:rPr lang="en-US" sz="2400" dirty="0">
+                <a:latin typeface="Arial" charset="0"/>
+                <a:ea typeface="Arial" charset="0"/>
+                <a:cs typeface="Arial" charset="0"/>
+              </a:rPr>
+              <a:t>than their peers who do not attend the workshop. They conclude that workshops </a:t>
+            </a:r>
+            <a:r>
+              <a:rPr lang="en-US" sz="2400" dirty="0" smtClean="0">
+                <a:latin typeface="Arial" charset="0"/>
+                <a:ea typeface="Arial" charset="0"/>
+                <a:cs typeface="Arial" charset="0"/>
+              </a:rPr>
+              <a:t>are extremely effective </a:t>
+            </a:r>
+            <a:r>
+              <a:rPr lang="en-US" sz="2400" dirty="0">
+                <a:latin typeface="Arial" charset="0"/>
+                <a:ea typeface="Arial" charset="0"/>
+                <a:cs typeface="Arial" charset="0"/>
+              </a:rPr>
+              <a:t>at helping students secure funding</a:t>
+            </a:r>
+            <a:r>
+              <a:rPr lang="en-US" sz="2400" dirty="0" smtClean="0">
+                <a:latin typeface="Arial" charset="0"/>
+                <a:ea typeface="Arial" charset="0"/>
+                <a:cs typeface="Arial" charset="0"/>
+              </a:rPr>
+              <a:t>.</a:t>
+            </a:r>
+            <a:endParaRPr lang="en-US" sz="2400" dirty="0">
+              <a:latin typeface="Arial" charset="0"/>
+              <a:ea typeface="Arial" charset="0"/>
+              <a:cs typeface="Arial" charset="0"/>
+            </a:endParaRPr>
+          </a:p>
+        </p:txBody>
+      </p:sp>
     </p:spTree>
     <p:extLst>
       <p:ext uri="{BB962C8B-B14F-4D97-AF65-F5344CB8AC3E}">
@@ -3549,6 +3786,13 @@
   <p:clrMapOvr>
     <a:masterClrMapping/>
   </p:clrMapOvr>
+  <p:timing>
+    <p:tnLst>
+      <p:par>
+        <p:cTn id="1" dur="indefinite" restart="never" nodeType="tmRoot"/>
+      </p:par>
+    </p:tnLst>
+  </p:timing>
 </p:sld>
 </file>
 
@@ -3592,35 +3836,213 @@
           </a:p>
         </p:txBody>
       </p:sp>
-      <p:pic>
-        <p:nvPicPr>
-          <p:cNvPr id="5" name="Content Placeholder 4"/>
-          <p:cNvPicPr>
-            <a:picLocks noGrp="1" noChangeAspect="1"/>
-          </p:cNvPicPr>
+      <p:sp>
+        <p:nvSpPr>
+          <p:cNvPr id="3" name="Content Placeholder 2"/>
+          <p:cNvSpPr>
+            <a:spLocks noGrp="1"/>
+          </p:cNvSpPr>
           <p:nvPr>
             <p:ph idx="1"/>
           </p:nvPr>
-        </p:nvPicPr>
-        <p:blipFill>
-          <a:blip r:embed="rId2">
-            <a:extLst>
-              <a:ext uri="{28A0092B-C50C-407E-A947-70E740481C1C}">
-                <a14:useLocalDpi xmlns:a14="http://schemas.microsoft.com/office/drawing/2010/main" val="0"/>
-              </a:ext>
-            </a:extLst>
-          </a:blip>
-          <a:stretch>
-            <a:fillRect/>
-          </a:stretch>
-        </p:blipFill>
-        <p:spPr>
-          <a:xfrm>
-            <a:off x="336000" y="2140788"/>
-            <a:ext cx="11520000" cy="2576425"/>
-          </a:xfrm>
-        </p:spPr>
-      </p:pic>
+        </p:nvSpPr>
+        <p:spPr/>
+        <p:txBody>
+          <a:bodyPr>
+            <a:normAutofit fontScale="77500" lnSpcReduction="20000"/>
+          </a:bodyPr>
+          <a:lstStyle/>
+          <a:p>
+            <a:pPr marL="0" indent="0" algn="just">
+              <a:lnSpc>
+                <a:spcPct val="170000"/>
+              </a:lnSpc>
+              <a:buNone/>
+            </a:pPr>
+            <a:r>
+              <a:rPr lang="en-US" dirty="0">
+                <a:latin typeface="Arial" charset="0"/>
+                <a:ea typeface="Arial" charset="0"/>
+                <a:cs typeface="Arial" charset="0"/>
+              </a:rPr>
+              <a:t>The MTC is interested in increase the number of scholarships McCaig </a:t>
+            </a:r>
+            <a:r>
+              <a:rPr lang="en-US" dirty="0" smtClean="0">
+                <a:latin typeface="Arial" charset="0"/>
+                <a:ea typeface="Arial" charset="0"/>
+                <a:cs typeface="Arial" charset="0"/>
+              </a:rPr>
+              <a:t>trainees are </a:t>
+            </a:r>
+            <a:r>
+              <a:rPr lang="en-US" dirty="0">
+                <a:latin typeface="Arial" charset="0"/>
+                <a:ea typeface="Arial" charset="0"/>
+                <a:cs typeface="Arial" charset="0"/>
+              </a:rPr>
+              <a:t>awarded. The MTC randomly funds 41 trainees to attend a workshop on </a:t>
+            </a:r>
+            <a:r>
+              <a:rPr lang="en-US" dirty="0" smtClean="0">
+                <a:latin typeface="Arial" charset="0"/>
+                <a:ea typeface="Arial" charset="0"/>
+                <a:cs typeface="Arial" charset="0"/>
+              </a:rPr>
+              <a:t>scholarship writing</a:t>
+            </a:r>
+            <a:r>
+              <a:rPr lang="en-US" dirty="0">
+                <a:latin typeface="Arial" charset="0"/>
+                <a:ea typeface="Arial" charset="0"/>
+                <a:cs typeface="Arial" charset="0"/>
+              </a:rPr>
+              <a:t>. The remaining 40 trainee do not attend the workshop. All trainees apply for </a:t>
+            </a:r>
+            <a:r>
+              <a:rPr lang="en-US" dirty="0" smtClean="0">
+                <a:latin typeface="Arial" charset="0"/>
+                <a:ea typeface="Arial" charset="0"/>
+                <a:cs typeface="Arial" charset="0"/>
+              </a:rPr>
+              <a:t>national funding </a:t>
+            </a:r>
+            <a:r>
+              <a:rPr lang="en-US" dirty="0">
+                <a:latin typeface="Arial" charset="0"/>
+                <a:ea typeface="Arial" charset="0"/>
+                <a:cs typeface="Arial" charset="0"/>
+              </a:rPr>
+              <a:t>and report their award value to the MTC. The MTC </a:t>
+            </a:r>
+            <a:r>
+              <a:rPr lang="en-US" dirty="0" smtClean="0">
+                <a:latin typeface="Arial" charset="0"/>
+                <a:ea typeface="Arial" charset="0"/>
+                <a:cs typeface="Arial" charset="0"/>
+              </a:rPr>
+              <a:t>finds </a:t>
+            </a:r>
+            <a:r>
+              <a:rPr lang="en-US" dirty="0">
+                <a:latin typeface="Arial" charset="0"/>
+                <a:ea typeface="Arial" charset="0"/>
+                <a:cs typeface="Arial" charset="0"/>
+              </a:rPr>
+              <a:t>that there is no </a:t>
+            </a:r>
+            <a:r>
+              <a:rPr lang="en-US" dirty="0" smtClean="0">
+                <a:latin typeface="Arial" charset="0"/>
+                <a:ea typeface="Arial" charset="0"/>
+                <a:cs typeface="Arial" charset="0"/>
+              </a:rPr>
+              <a:t>difference in </a:t>
+            </a:r>
+            <a:r>
+              <a:rPr lang="en-US" dirty="0">
+                <a:latin typeface="Arial" charset="0"/>
+                <a:ea typeface="Arial" charset="0"/>
+                <a:cs typeface="Arial" charset="0"/>
+              </a:rPr>
+              <a:t>the amount of funding secured by trainees who attended the workshop compared to </a:t>
+            </a:r>
+            <a:r>
+              <a:rPr lang="en-US" dirty="0" smtClean="0">
+                <a:latin typeface="Arial" charset="0"/>
+                <a:ea typeface="Arial" charset="0"/>
+                <a:cs typeface="Arial" charset="0"/>
+              </a:rPr>
+              <a:t>those who </a:t>
+            </a:r>
+            <a:r>
+              <a:rPr lang="en-US" dirty="0">
+                <a:latin typeface="Arial" charset="0"/>
+                <a:ea typeface="Arial" charset="0"/>
+                <a:cs typeface="Arial" charset="0"/>
+              </a:rPr>
+              <a:t>do attend. The MTC </a:t>
+            </a:r>
+            <a:r>
+              <a:rPr lang="en-US" dirty="0" smtClean="0">
+                <a:latin typeface="Arial" charset="0"/>
+                <a:ea typeface="Arial" charset="0"/>
+                <a:cs typeface="Arial" charset="0"/>
+              </a:rPr>
+              <a:t>find </a:t>
+            </a:r>
+            <a:r>
+              <a:rPr lang="en-US" dirty="0">
+                <a:latin typeface="Arial" charset="0"/>
+                <a:ea typeface="Arial" charset="0"/>
+                <a:cs typeface="Arial" charset="0"/>
+              </a:rPr>
+              <a:t>that scholarship workshops have no </a:t>
+            </a:r>
+            <a:r>
+              <a:rPr lang="en-US" dirty="0" smtClean="0">
+                <a:latin typeface="Arial" charset="0"/>
+                <a:ea typeface="Arial" charset="0"/>
+                <a:cs typeface="Arial" charset="0"/>
+              </a:rPr>
+              <a:t>effect </a:t>
+            </a:r>
+            <a:r>
+              <a:rPr lang="en-US" dirty="0">
+                <a:latin typeface="Arial" charset="0"/>
+                <a:ea typeface="Arial" charset="0"/>
+                <a:cs typeface="Arial" charset="0"/>
+              </a:rPr>
+              <a:t>on funding </a:t>
+            </a:r>
+            <a:r>
+              <a:rPr lang="en-US" dirty="0" smtClean="0">
+                <a:latin typeface="Arial" charset="0"/>
+                <a:ea typeface="Arial" charset="0"/>
+                <a:cs typeface="Arial" charset="0"/>
+              </a:rPr>
+              <a:t>success and </a:t>
+            </a:r>
+            <a:r>
+              <a:rPr lang="en-US" dirty="0">
+                <a:latin typeface="Arial" charset="0"/>
+                <a:ea typeface="Arial" charset="0"/>
+                <a:cs typeface="Arial" charset="0"/>
+              </a:rPr>
+              <a:t>stops </a:t>
+            </a:r>
+            <a:r>
+              <a:rPr lang="en-US" dirty="0" smtClean="0">
+                <a:latin typeface="Arial" charset="0"/>
+                <a:ea typeface="Arial" charset="0"/>
+                <a:cs typeface="Arial" charset="0"/>
+              </a:rPr>
+              <a:t>financially </a:t>
+            </a:r>
+            <a:r>
+              <a:rPr lang="en-US" dirty="0">
+                <a:latin typeface="Arial" charset="0"/>
+                <a:ea typeface="Arial" charset="0"/>
+                <a:cs typeface="Arial" charset="0"/>
+              </a:rPr>
+              <a:t>supporting the workshop.</a:t>
+            </a:r>
+          </a:p>
+          <a:p>
+            <a:pPr marL="0" indent="0" algn="just">
+              <a:lnSpc>
+                <a:spcPct val="170000"/>
+              </a:lnSpc>
+              <a:buNone/>
+            </a:pPr>
+            <a:endParaRPr lang="en-US" dirty="0">
+              <a:latin typeface="Arial" charset="0"/>
+              <a:ea typeface="Arial" charset="0"/>
+              <a:cs typeface="Arial" charset="0"/>
+            </a:endParaRPr>
+          </a:p>
+        </p:txBody>
+      </p:sp>
     </p:spTree>
     <p:extLst>
       <p:ext uri="{BB962C8B-B14F-4D97-AF65-F5344CB8AC3E}">
@@ -3631,6 +4053,13 @@
   <p:clrMapOvr>
     <a:masterClrMapping/>
   </p:clrMapOvr>
+  <p:timing>
+    <p:tnLst>
+      <p:par>
+        <p:cTn id="1" dur="indefinite" restart="never" nodeType="tmRoot"/>
+      </p:par>
+    </p:tnLst>
+  </p:timing>
 </p:sld>
 </file>
 
@@ -3703,6 +4132,40 @@
           </a:xfrm>
         </p:spPr>
       </p:pic>
+      <p:sp>
+        <p:nvSpPr>
+          <p:cNvPr id="3" name="TextBox 2"/>
+          <p:cNvSpPr txBox="1"/>
+          <p:nvPr/>
+        </p:nvSpPr>
+        <p:spPr>
+          <a:xfrm>
+            <a:off x="336000" y="5711868"/>
+            <a:ext cx="11017800" cy="646331"/>
+          </a:xfrm>
+          <a:prstGeom prst="rect">
+            <a:avLst/>
+          </a:prstGeom>
+          <a:noFill/>
+        </p:spPr>
+        <p:txBody>
+          <a:bodyPr wrap="square" rtlCol="0">
+            <a:spAutoFit/>
+          </a:bodyPr>
+          <a:lstStyle/>
+          <a:p>
+            <a:r>
+              <a:rPr lang="en-US" sz="3600" b="1" dirty="0"/>
+              <a:t>Sample </a:t>
+            </a:r>
+            <a:r>
+              <a:rPr lang="en-US" sz="3600" b="1" dirty="0" smtClean="0"/>
+              <a:t>Size, Experimental Units, Treatment, Outcome</a:t>
+            </a:r>
+            <a:endParaRPr lang="en-US" sz="3600" b="1" dirty="0"/>
+          </a:p>
+        </p:txBody>
+      </p:sp>
     </p:spTree>
     <p:extLst>
       <p:ext uri="{BB962C8B-B14F-4D97-AF65-F5344CB8AC3E}">
@@ -3713,6 +4176,13 @@
   <p:clrMapOvr>
     <a:masterClrMapping/>
   </p:clrMapOvr>
+  <p:timing>
+    <p:tnLst>
+      <p:par>
+        <p:cTn id="1" dur="indefinite" restart="never" nodeType="tmRoot"/>
+      </p:par>
+    </p:tnLst>
+  </p:timing>
 </p:sld>
 </file>
 

</xml_diff>